<commit_message>
Project Section & Image Update
</commit_message>
<xml_diff>
--- a/images/processing.pptx
+++ b/images/processing.pptx
@@ -260,7 +260,7 @@
           <a:p>
             <a:fld id="{43785865-FAB0-485D-8F59-47D3DFEE82A1}" type="datetimeFigureOut">
               <a:rPr lang="zh-TW" altLang="en-US" smtClean="0"/>
-              <a:t>2024/5/19</a:t>
+              <a:t>2024/5/22</a:t>
             </a:fld>
             <a:endParaRPr lang="zh-TW" altLang="en-US"/>
           </a:p>
@@ -458,7 +458,7 @@
           <a:p>
             <a:fld id="{43785865-FAB0-485D-8F59-47D3DFEE82A1}" type="datetimeFigureOut">
               <a:rPr lang="zh-TW" altLang="en-US" smtClean="0"/>
-              <a:t>2024/5/19</a:t>
+              <a:t>2024/5/22</a:t>
             </a:fld>
             <a:endParaRPr lang="zh-TW" altLang="en-US"/>
           </a:p>
@@ -666,7 +666,7 @@
           <a:p>
             <a:fld id="{43785865-FAB0-485D-8F59-47D3DFEE82A1}" type="datetimeFigureOut">
               <a:rPr lang="zh-TW" altLang="en-US" smtClean="0"/>
-              <a:t>2024/5/19</a:t>
+              <a:t>2024/5/22</a:t>
             </a:fld>
             <a:endParaRPr lang="zh-TW" altLang="en-US"/>
           </a:p>
@@ -864,7 +864,7 @@
           <a:p>
             <a:fld id="{43785865-FAB0-485D-8F59-47D3DFEE82A1}" type="datetimeFigureOut">
               <a:rPr lang="zh-TW" altLang="en-US" smtClean="0"/>
-              <a:t>2024/5/19</a:t>
+              <a:t>2024/5/22</a:t>
             </a:fld>
             <a:endParaRPr lang="zh-TW" altLang="en-US"/>
           </a:p>
@@ -1139,7 +1139,7 @@
           <a:p>
             <a:fld id="{43785865-FAB0-485D-8F59-47D3DFEE82A1}" type="datetimeFigureOut">
               <a:rPr lang="zh-TW" altLang="en-US" smtClean="0"/>
-              <a:t>2024/5/19</a:t>
+              <a:t>2024/5/22</a:t>
             </a:fld>
             <a:endParaRPr lang="zh-TW" altLang="en-US"/>
           </a:p>
@@ -1404,7 +1404,7 @@
           <a:p>
             <a:fld id="{43785865-FAB0-485D-8F59-47D3DFEE82A1}" type="datetimeFigureOut">
               <a:rPr lang="zh-TW" altLang="en-US" smtClean="0"/>
-              <a:t>2024/5/19</a:t>
+              <a:t>2024/5/22</a:t>
             </a:fld>
             <a:endParaRPr lang="zh-TW" altLang="en-US"/>
           </a:p>
@@ -1816,7 +1816,7 @@
           <a:p>
             <a:fld id="{43785865-FAB0-485D-8F59-47D3DFEE82A1}" type="datetimeFigureOut">
               <a:rPr lang="zh-TW" altLang="en-US" smtClean="0"/>
-              <a:t>2024/5/19</a:t>
+              <a:t>2024/5/22</a:t>
             </a:fld>
             <a:endParaRPr lang="zh-TW" altLang="en-US"/>
           </a:p>
@@ -1957,7 +1957,7 @@
           <a:p>
             <a:fld id="{43785865-FAB0-485D-8F59-47D3DFEE82A1}" type="datetimeFigureOut">
               <a:rPr lang="zh-TW" altLang="en-US" smtClean="0"/>
-              <a:t>2024/5/19</a:t>
+              <a:t>2024/5/22</a:t>
             </a:fld>
             <a:endParaRPr lang="zh-TW" altLang="en-US"/>
           </a:p>
@@ -2070,7 +2070,7 @@
           <a:p>
             <a:fld id="{43785865-FAB0-485D-8F59-47D3DFEE82A1}" type="datetimeFigureOut">
               <a:rPr lang="zh-TW" altLang="en-US" smtClean="0"/>
-              <a:t>2024/5/19</a:t>
+              <a:t>2024/5/22</a:t>
             </a:fld>
             <a:endParaRPr lang="zh-TW" altLang="en-US"/>
           </a:p>
@@ -2381,7 +2381,7 @@
           <a:p>
             <a:fld id="{43785865-FAB0-485D-8F59-47D3DFEE82A1}" type="datetimeFigureOut">
               <a:rPr lang="zh-TW" altLang="en-US" smtClean="0"/>
-              <a:t>2024/5/19</a:t>
+              <a:t>2024/5/22</a:t>
             </a:fld>
             <a:endParaRPr lang="zh-TW" altLang="en-US"/>
           </a:p>
@@ -2669,7 +2669,7 @@
           <a:p>
             <a:fld id="{43785865-FAB0-485D-8F59-47D3DFEE82A1}" type="datetimeFigureOut">
               <a:rPr lang="zh-TW" altLang="en-US" smtClean="0"/>
-              <a:t>2024/5/19</a:t>
+              <a:t>2024/5/22</a:t>
             </a:fld>
             <a:endParaRPr lang="zh-TW" altLang="en-US"/>
           </a:p>
@@ -2910,7 +2910,7 @@
           <a:p>
             <a:fld id="{43785865-FAB0-485D-8F59-47D3DFEE82A1}" type="datetimeFigureOut">
               <a:rPr lang="zh-TW" altLang="en-US" smtClean="0"/>
-              <a:t>2024/5/19</a:t>
+              <a:t>2024/5/22</a:t>
             </a:fld>
             <a:endParaRPr lang="zh-TW" altLang="en-US"/>
           </a:p>
@@ -3494,10 +3494,10 @@
       </p:pic>
       <p:sp>
         <p:nvSpPr>
-          <p:cNvPr id="6" name="矩形: 圓角 5">
-            <a:extLst>
-              <a:ext uri="{FF2B5EF4-FFF2-40B4-BE49-F238E27FC236}">
-                <a16:creationId xmlns:a16="http://schemas.microsoft.com/office/drawing/2014/main" id="{7FF232DA-47AE-F048-7DFD-B8E8F9791BE0}"/>
+          <p:cNvPr id="2" name="矩形 1">
+            <a:extLst>
+              <a:ext uri="{FF2B5EF4-FFF2-40B4-BE49-F238E27FC236}">
+                <a16:creationId xmlns:a16="http://schemas.microsoft.com/office/drawing/2014/main" id="{BDA0A1E4-AB14-CAB0-1B37-1064785917F8}"/>
               </a:ext>
             </a:extLst>
           </p:cNvPr>
@@ -3506,25 +3506,20 @@
         </p:nvSpPr>
         <p:spPr>
           <a:xfrm>
-            <a:off x="3489434" y="2412126"/>
-            <a:ext cx="5213132" cy="2233445"/>
+            <a:off x="0" y="1312917"/>
+            <a:ext cx="12192000" cy="4064000"/>
           </a:xfrm>
-          <a:prstGeom prst="roundRect">
-            <a:avLst>
-              <a:gd name="adj" fmla="val 42000"/>
-            </a:avLst>
+          <a:prstGeom prst="rect">
+            <a:avLst/>
           </a:prstGeom>
           <a:solidFill>
             <a:schemeClr val="bg1">
-              <a:alpha val="75000"/>
+              <a:alpha val="72000"/>
             </a:schemeClr>
           </a:solidFill>
           <a:ln>
             <a:noFill/>
           </a:ln>
-          <a:effectLst>
-            <a:softEdge rad="203200"/>
-          </a:effectLst>
         </p:spPr>
         <p:style>
           <a:lnRef idx="2">

</xml_diff>

<commit_message>
Gallery - Pencil Section
</commit_message>
<xml_diff>
--- a/images/processing.pptx
+++ b/images/processing.pptx
@@ -8,6 +8,7 @@
     <p:sldId id="256" r:id="rId2"/>
     <p:sldId id="257" r:id="rId3"/>
     <p:sldId id="258" r:id="rId4"/>
+    <p:sldId id="259" r:id="rId5"/>
   </p:sldIdLst>
   <p:sldSz cx="12192000" cy="6858000"/>
   <p:notesSz cx="6858000" cy="9144000"/>
@@ -3696,6 +3697,116 @@
 </p:sld>
 </file>
 
+<file path=ppt/slides/slide4.xml><?xml version="1.0" encoding="utf-8"?>
+<p:sld xmlns:a="http://schemas.openxmlformats.org/drawingml/2006/main" xmlns:r="http://schemas.openxmlformats.org/officeDocument/2006/relationships" xmlns:p="http://schemas.openxmlformats.org/presentationml/2006/main">
+  <p:cSld>
+    <p:spTree>
+      <p:nvGrpSpPr>
+        <p:cNvPr id="1" name=""/>
+        <p:cNvGrpSpPr/>
+        <p:nvPr/>
+      </p:nvGrpSpPr>
+      <p:grpSpPr>
+        <a:xfrm>
+          <a:off x="0" y="0"/>
+          <a:ext cx="0" cy="0"/>
+          <a:chOff x="0" y="0"/>
+          <a:chExt cx="0" cy="0"/>
+        </a:xfrm>
+      </p:grpSpPr>
+      <p:pic>
+        <p:nvPicPr>
+          <p:cNvPr id="5" name="圖片 4">
+            <a:extLst>
+              <a:ext uri="{FF2B5EF4-FFF2-40B4-BE49-F238E27FC236}">
+                <a16:creationId xmlns:a16="http://schemas.microsoft.com/office/drawing/2014/main" id="{FFA9E5B1-18B8-7D05-F616-077E0712DE10}"/>
+              </a:ext>
+            </a:extLst>
+          </p:cNvPr>
+          <p:cNvPicPr>
+            <a:picLocks noChangeAspect="1"/>
+          </p:cNvPicPr>
+          <p:nvPr/>
+        </p:nvPicPr>
+        <p:blipFill>
+          <a:blip r:embed="rId2">
+            <a:extLst>
+              <a:ext uri="{28A0092B-C50C-407E-A947-70E740481C1C}">
+                <a14:useLocalDpi xmlns:a14="http://schemas.microsoft.com/office/drawing/2010/main" val="0"/>
+              </a:ext>
+            </a:extLst>
+          </a:blip>
+          <a:stretch>
+            <a:fillRect/>
+          </a:stretch>
+        </p:blipFill>
+        <p:spPr>
+          <a:xfrm>
+            <a:off x="3524250" y="0"/>
+            <a:ext cx="5143500" cy="6858000"/>
+          </a:xfrm>
+          <a:prstGeom prst="rect">
+            <a:avLst/>
+          </a:prstGeom>
+        </p:spPr>
+      </p:pic>
+      <p:sp>
+        <p:nvSpPr>
+          <p:cNvPr id="7" name="文字方塊 6">
+            <a:extLst>
+              <a:ext uri="{FF2B5EF4-FFF2-40B4-BE49-F238E27FC236}">
+                <a16:creationId xmlns:a16="http://schemas.microsoft.com/office/drawing/2014/main" id="{6E7E04F3-81A4-D329-2DC9-F5006BFF7B55}"/>
+              </a:ext>
+            </a:extLst>
+          </p:cNvPr>
+          <p:cNvSpPr txBox="1"/>
+          <p:nvPr/>
+        </p:nvSpPr>
+        <p:spPr>
+          <a:xfrm rot="21429661">
+            <a:off x="3629853" y="4836840"/>
+            <a:ext cx="4912415" cy="353943"/>
+          </a:xfrm>
+          <a:prstGeom prst="rect">
+            <a:avLst/>
+          </a:prstGeom>
+          <a:noFill/>
+        </p:spPr>
+        <p:txBody>
+          <a:bodyPr wrap="square">
+            <a:spAutoFit/>
+            <a:scene3d>
+              <a:camera prst="perspectiveRelaxedModerately"/>
+              <a:lightRig rig="threePt" dir="t"/>
+            </a:scene3d>
+          </a:bodyPr>
+          <a:lstStyle/>
+          <a:p>
+            <a:pPr algn="ctr"/>
+            <a:r>
+              <a:rPr lang="zh-TW" altLang="en-US" sz="1700" dirty="0">
+                <a:solidFill>
+                  <a:srgbClr val="C00000"/>
+                </a:solidFill>
+              </a:rPr>
+              <a:t>https://www.youtube.com/shorts/0dXxNEILw38</a:t>
+            </a:r>
+          </a:p>
+        </p:txBody>
+      </p:sp>
+    </p:spTree>
+    <p:extLst>
+      <p:ext uri="{BB962C8B-B14F-4D97-AF65-F5344CB8AC3E}">
+        <p14:creationId xmlns:p14="http://schemas.microsoft.com/office/powerpoint/2010/main" val="2735730466"/>
+      </p:ext>
+    </p:extLst>
+  </p:cSld>
+  <p:clrMapOvr>
+    <a:masterClrMapping/>
+  </p:clrMapOvr>
+</p:sld>
+</file>
+
 <file path=ppt/theme/theme1.xml><?xml version="1.0" encoding="utf-8"?>
 <a:theme xmlns:a="http://schemas.openxmlformats.org/drawingml/2006/main" name="Office 佈景主題">
   <a:themeElements>

</xml_diff>

<commit_message>
LINE Sticker Section Complete
</commit_message>
<xml_diff>
--- a/images/processing.pptx
+++ b/images/processing.pptx
@@ -9,6 +9,11 @@
     <p:sldId id="257" r:id="rId3"/>
     <p:sldId id="258" r:id="rId4"/>
     <p:sldId id="259" r:id="rId5"/>
+    <p:sldId id="260" r:id="rId6"/>
+    <p:sldId id="261" r:id="rId7"/>
+    <p:sldId id="262" r:id="rId8"/>
+    <p:sldId id="263" r:id="rId9"/>
+    <p:sldId id="264" r:id="rId10"/>
   </p:sldIdLst>
   <p:sldSz cx="12192000" cy="6858000"/>
   <p:notesSz cx="6858000" cy="9144000"/>
@@ -3807,6 +3812,596 @@
 </p:sld>
 </file>
 
+<file path=ppt/slides/slide5.xml><?xml version="1.0" encoding="utf-8"?>
+<p:sld xmlns:a="http://schemas.openxmlformats.org/drawingml/2006/main" xmlns:r="http://schemas.openxmlformats.org/officeDocument/2006/relationships" xmlns:p="http://schemas.openxmlformats.org/presentationml/2006/main">
+  <p:cSld>
+    <p:spTree>
+      <p:nvGrpSpPr>
+        <p:cNvPr id="1" name=""/>
+        <p:cNvGrpSpPr/>
+        <p:nvPr/>
+      </p:nvGrpSpPr>
+      <p:grpSpPr>
+        <a:xfrm>
+          <a:off x="0" y="0"/>
+          <a:ext cx="0" cy="0"/>
+          <a:chOff x="0" y="0"/>
+          <a:chExt cx="0" cy="0"/>
+        </a:xfrm>
+      </p:grpSpPr>
+      <p:sp>
+        <p:nvSpPr>
+          <p:cNvPr id="6" name="矩形 5">
+            <a:extLst>
+              <a:ext uri="{FF2B5EF4-FFF2-40B4-BE49-F238E27FC236}">
+                <a16:creationId xmlns:a16="http://schemas.microsoft.com/office/drawing/2014/main" id="{8667C163-184C-C350-9735-2B23EDD3E681}"/>
+              </a:ext>
+            </a:extLst>
+          </p:cNvPr>
+          <p:cNvSpPr/>
+          <p:nvPr/>
+        </p:nvSpPr>
+        <p:spPr>
+          <a:xfrm>
+            <a:off x="3907746" y="1095703"/>
+            <a:ext cx="4376508" cy="4666593"/>
+          </a:xfrm>
+          <a:prstGeom prst="rect">
+            <a:avLst/>
+          </a:prstGeom>
+          <a:solidFill>
+            <a:schemeClr val="bg1"/>
+          </a:solidFill>
+          <a:ln>
+            <a:noFill/>
+          </a:ln>
+        </p:spPr>
+        <p:style>
+          <a:lnRef idx="2">
+            <a:schemeClr val="accent1">
+              <a:shade val="15000"/>
+            </a:schemeClr>
+          </a:lnRef>
+          <a:fillRef idx="1">
+            <a:schemeClr val="accent1"/>
+          </a:fillRef>
+          <a:effectRef idx="0">
+            <a:schemeClr val="accent1"/>
+          </a:effectRef>
+          <a:fontRef idx="minor">
+            <a:schemeClr val="lt1"/>
+          </a:fontRef>
+        </p:style>
+        <p:txBody>
+          <a:bodyPr rtlCol="0" anchor="ctr"/>
+          <a:lstStyle/>
+          <a:p>
+            <a:pPr algn="ctr"/>
+            <a:endParaRPr lang="zh-TW" altLang="en-US"/>
+          </a:p>
+        </p:txBody>
+      </p:sp>
+      <p:pic>
+        <p:nvPicPr>
+          <p:cNvPr id="5" name="圖片 4">
+            <a:extLst>
+              <a:ext uri="{FF2B5EF4-FFF2-40B4-BE49-F238E27FC236}">
+                <a16:creationId xmlns:a16="http://schemas.microsoft.com/office/drawing/2014/main" id="{7A1709BE-29D1-D43C-7E80-460ABD7708D3}"/>
+              </a:ext>
+            </a:extLst>
+          </p:cNvPr>
+          <p:cNvPicPr>
+            <a:picLocks noChangeAspect="1"/>
+          </p:cNvPicPr>
+          <p:nvPr/>
+        </p:nvPicPr>
+        <p:blipFill>
+          <a:blip r:embed="rId2">
+            <a:extLst>
+              <a:ext uri="{28A0092B-C50C-407E-A947-70E740481C1C}">
+                <a14:useLocalDpi xmlns:a14="http://schemas.microsoft.com/office/drawing/2010/main" val="0"/>
+              </a:ext>
+            </a:extLst>
+          </a:blip>
+          <a:stretch>
+            <a:fillRect/>
+          </a:stretch>
+        </p:blipFill>
+        <p:spPr>
+          <a:xfrm>
+            <a:off x="4235669" y="1568668"/>
+            <a:ext cx="3720662" cy="3720662"/>
+          </a:xfrm>
+          <a:prstGeom prst="rect">
+            <a:avLst/>
+          </a:prstGeom>
+        </p:spPr>
+      </p:pic>
+    </p:spTree>
+    <p:extLst>
+      <p:ext uri="{BB962C8B-B14F-4D97-AF65-F5344CB8AC3E}">
+        <p14:creationId xmlns:p14="http://schemas.microsoft.com/office/powerpoint/2010/main" val="1633940062"/>
+      </p:ext>
+    </p:extLst>
+  </p:cSld>
+  <p:clrMapOvr>
+    <a:masterClrMapping/>
+  </p:clrMapOvr>
+</p:sld>
+</file>
+
+<file path=ppt/slides/slide6.xml><?xml version="1.0" encoding="utf-8"?>
+<p:sld xmlns:a="http://schemas.openxmlformats.org/drawingml/2006/main" xmlns:r="http://schemas.openxmlformats.org/officeDocument/2006/relationships" xmlns:p="http://schemas.openxmlformats.org/presentationml/2006/main">
+  <p:cSld>
+    <p:spTree>
+      <p:nvGrpSpPr>
+        <p:cNvPr id="1" name=""/>
+        <p:cNvGrpSpPr/>
+        <p:nvPr/>
+      </p:nvGrpSpPr>
+      <p:grpSpPr>
+        <a:xfrm>
+          <a:off x="0" y="0"/>
+          <a:ext cx="0" cy="0"/>
+          <a:chOff x="0" y="0"/>
+          <a:chExt cx="0" cy="0"/>
+        </a:xfrm>
+      </p:grpSpPr>
+      <p:sp>
+        <p:nvSpPr>
+          <p:cNvPr id="6" name="矩形 5">
+            <a:extLst>
+              <a:ext uri="{FF2B5EF4-FFF2-40B4-BE49-F238E27FC236}">
+                <a16:creationId xmlns:a16="http://schemas.microsoft.com/office/drawing/2014/main" id="{8667C163-184C-C350-9735-2B23EDD3E681}"/>
+              </a:ext>
+            </a:extLst>
+          </p:cNvPr>
+          <p:cNvSpPr/>
+          <p:nvPr/>
+        </p:nvSpPr>
+        <p:spPr>
+          <a:xfrm>
+            <a:off x="3907746" y="1095703"/>
+            <a:ext cx="4376508" cy="4666593"/>
+          </a:xfrm>
+          <a:prstGeom prst="rect">
+            <a:avLst/>
+          </a:prstGeom>
+          <a:solidFill>
+            <a:schemeClr val="bg1"/>
+          </a:solidFill>
+          <a:ln>
+            <a:noFill/>
+          </a:ln>
+        </p:spPr>
+        <p:style>
+          <a:lnRef idx="2">
+            <a:schemeClr val="accent1">
+              <a:shade val="15000"/>
+            </a:schemeClr>
+          </a:lnRef>
+          <a:fillRef idx="1">
+            <a:schemeClr val="accent1"/>
+          </a:fillRef>
+          <a:effectRef idx="0">
+            <a:schemeClr val="accent1"/>
+          </a:effectRef>
+          <a:fontRef idx="minor">
+            <a:schemeClr val="lt1"/>
+          </a:fontRef>
+        </p:style>
+        <p:txBody>
+          <a:bodyPr rtlCol="0" anchor="ctr"/>
+          <a:lstStyle/>
+          <a:p>
+            <a:pPr algn="ctr"/>
+            <a:endParaRPr lang="zh-TW" altLang="en-US"/>
+          </a:p>
+        </p:txBody>
+      </p:sp>
+      <p:pic>
+        <p:nvPicPr>
+          <p:cNvPr id="3" name="圖片 2">
+            <a:extLst>
+              <a:ext uri="{FF2B5EF4-FFF2-40B4-BE49-F238E27FC236}">
+                <a16:creationId xmlns:a16="http://schemas.microsoft.com/office/drawing/2014/main" id="{EC45EEAC-B8F1-53B1-BD76-8C0AA8078419}"/>
+              </a:ext>
+            </a:extLst>
+          </p:cNvPr>
+          <p:cNvPicPr>
+            <a:picLocks noChangeAspect="1"/>
+          </p:cNvPicPr>
+          <p:nvPr/>
+        </p:nvPicPr>
+        <p:blipFill>
+          <a:blip r:embed="rId2">
+            <a:extLst>
+              <a:ext uri="{28A0092B-C50C-407E-A947-70E740481C1C}">
+                <a14:useLocalDpi xmlns:a14="http://schemas.microsoft.com/office/drawing/2010/main" val="0"/>
+              </a:ext>
+            </a:extLst>
+          </a:blip>
+          <a:stretch>
+            <a:fillRect/>
+          </a:stretch>
+        </p:blipFill>
+        <p:spPr>
+          <a:xfrm>
+            <a:off x="4172607" y="1411014"/>
+            <a:ext cx="3846786" cy="3846786"/>
+          </a:xfrm>
+          <a:prstGeom prst="rect">
+            <a:avLst/>
+          </a:prstGeom>
+        </p:spPr>
+      </p:pic>
+    </p:spTree>
+    <p:extLst>
+      <p:ext uri="{BB962C8B-B14F-4D97-AF65-F5344CB8AC3E}">
+        <p14:creationId xmlns:p14="http://schemas.microsoft.com/office/powerpoint/2010/main" val="772092522"/>
+      </p:ext>
+    </p:extLst>
+  </p:cSld>
+  <p:clrMapOvr>
+    <a:masterClrMapping/>
+  </p:clrMapOvr>
+</p:sld>
+</file>
+
+<file path=ppt/slides/slide7.xml><?xml version="1.0" encoding="utf-8"?>
+<p:sld xmlns:a="http://schemas.openxmlformats.org/drawingml/2006/main" xmlns:r="http://schemas.openxmlformats.org/officeDocument/2006/relationships" xmlns:p="http://schemas.openxmlformats.org/presentationml/2006/main">
+  <p:cSld>
+    <p:spTree>
+      <p:nvGrpSpPr>
+        <p:cNvPr id="1" name=""/>
+        <p:cNvGrpSpPr/>
+        <p:nvPr/>
+      </p:nvGrpSpPr>
+      <p:grpSpPr>
+        <a:xfrm>
+          <a:off x="0" y="0"/>
+          <a:ext cx="0" cy="0"/>
+          <a:chOff x="0" y="0"/>
+          <a:chExt cx="0" cy="0"/>
+        </a:xfrm>
+      </p:grpSpPr>
+      <p:sp>
+        <p:nvSpPr>
+          <p:cNvPr id="6" name="矩形 5">
+            <a:extLst>
+              <a:ext uri="{FF2B5EF4-FFF2-40B4-BE49-F238E27FC236}">
+                <a16:creationId xmlns:a16="http://schemas.microsoft.com/office/drawing/2014/main" id="{8667C163-184C-C350-9735-2B23EDD3E681}"/>
+              </a:ext>
+            </a:extLst>
+          </p:cNvPr>
+          <p:cNvSpPr/>
+          <p:nvPr/>
+        </p:nvSpPr>
+        <p:spPr>
+          <a:xfrm>
+            <a:off x="3907746" y="1095703"/>
+            <a:ext cx="4376508" cy="4666593"/>
+          </a:xfrm>
+          <a:prstGeom prst="rect">
+            <a:avLst/>
+          </a:prstGeom>
+          <a:solidFill>
+            <a:schemeClr val="bg1"/>
+          </a:solidFill>
+          <a:ln>
+            <a:noFill/>
+          </a:ln>
+        </p:spPr>
+        <p:style>
+          <a:lnRef idx="2">
+            <a:schemeClr val="accent1">
+              <a:shade val="15000"/>
+            </a:schemeClr>
+          </a:lnRef>
+          <a:fillRef idx="1">
+            <a:schemeClr val="accent1"/>
+          </a:fillRef>
+          <a:effectRef idx="0">
+            <a:schemeClr val="accent1"/>
+          </a:effectRef>
+          <a:fontRef idx="minor">
+            <a:schemeClr val="lt1"/>
+          </a:fontRef>
+        </p:style>
+        <p:txBody>
+          <a:bodyPr rtlCol="0" anchor="ctr"/>
+          <a:lstStyle/>
+          <a:p>
+            <a:pPr algn="ctr"/>
+            <a:endParaRPr lang="zh-TW" altLang="en-US"/>
+          </a:p>
+        </p:txBody>
+      </p:sp>
+      <p:pic>
+        <p:nvPicPr>
+          <p:cNvPr id="4" name="圖片 3">
+            <a:extLst>
+              <a:ext uri="{FF2B5EF4-FFF2-40B4-BE49-F238E27FC236}">
+                <a16:creationId xmlns:a16="http://schemas.microsoft.com/office/drawing/2014/main" id="{CF7E1800-4E44-323F-8A64-CD45B07293D8}"/>
+              </a:ext>
+            </a:extLst>
+          </p:cNvPr>
+          <p:cNvPicPr>
+            <a:picLocks noChangeAspect="1"/>
+          </p:cNvPicPr>
+          <p:nvPr/>
+        </p:nvPicPr>
+        <p:blipFill>
+          <a:blip r:embed="rId2">
+            <a:extLst>
+              <a:ext uri="{28A0092B-C50C-407E-A947-70E740481C1C}">
+                <a14:useLocalDpi xmlns:a14="http://schemas.microsoft.com/office/drawing/2010/main" val="0"/>
+              </a:ext>
+            </a:extLst>
+          </a:blip>
+          <a:stretch>
+            <a:fillRect/>
+          </a:stretch>
+        </p:blipFill>
+        <p:spPr>
+          <a:xfrm>
+            <a:off x="4593021" y="1926021"/>
+            <a:ext cx="3005958" cy="3005958"/>
+          </a:xfrm>
+          <a:prstGeom prst="rect">
+            <a:avLst/>
+          </a:prstGeom>
+        </p:spPr>
+      </p:pic>
+    </p:spTree>
+    <p:extLst>
+      <p:ext uri="{BB962C8B-B14F-4D97-AF65-F5344CB8AC3E}">
+        <p14:creationId xmlns:p14="http://schemas.microsoft.com/office/powerpoint/2010/main" val="1422904746"/>
+      </p:ext>
+    </p:extLst>
+  </p:cSld>
+  <p:clrMapOvr>
+    <a:masterClrMapping/>
+  </p:clrMapOvr>
+</p:sld>
+</file>
+
+<file path=ppt/slides/slide8.xml><?xml version="1.0" encoding="utf-8"?>
+<p:sld xmlns:a="http://schemas.openxmlformats.org/drawingml/2006/main" xmlns:r="http://schemas.openxmlformats.org/officeDocument/2006/relationships" xmlns:p="http://schemas.openxmlformats.org/presentationml/2006/main">
+  <p:cSld>
+    <p:spTree>
+      <p:nvGrpSpPr>
+        <p:cNvPr id="1" name=""/>
+        <p:cNvGrpSpPr/>
+        <p:nvPr/>
+      </p:nvGrpSpPr>
+      <p:grpSpPr>
+        <a:xfrm>
+          <a:off x="0" y="0"/>
+          <a:ext cx="0" cy="0"/>
+          <a:chOff x="0" y="0"/>
+          <a:chExt cx="0" cy="0"/>
+        </a:xfrm>
+      </p:grpSpPr>
+      <p:sp>
+        <p:nvSpPr>
+          <p:cNvPr id="6" name="矩形 5">
+            <a:extLst>
+              <a:ext uri="{FF2B5EF4-FFF2-40B4-BE49-F238E27FC236}">
+                <a16:creationId xmlns:a16="http://schemas.microsoft.com/office/drawing/2014/main" id="{8667C163-184C-C350-9735-2B23EDD3E681}"/>
+              </a:ext>
+            </a:extLst>
+          </p:cNvPr>
+          <p:cNvSpPr/>
+          <p:nvPr/>
+        </p:nvSpPr>
+        <p:spPr>
+          <a:xfrm>
+            <a:off x="3907746" y="1095703"/>
+            <a:ext cx="4376508" cy="4666593"/>
+          </a:xfrm>
+          <a:prstGeom prst="rect">
+            <a:avLst/>
+          </a:prstGeom>
+          <a:solidFill>
+            <a:schemeClr val="bg1"/>
+          </a:solidFill>
+          <a:ln>
+            <a:noFill/>
+          </a:ln>
+        </p:spPr>
+        <p:style>
+          <a:lnRef idx="2">
+            <a:schemeClr val="accent1">
+              <a:shade val="15000"/>
+            </a:schemeClr>
+          </a:lnRef>
+          <a:fillRef idx="1">
+            <a:schemeClr val="accent1"/>
+          </a:fillRef>
+          <a:effectRef idx="0">
+            <a:schemeClr val="accent1"/>
+          </a:effectRef>
+          <a:fontRef idx="minor">
+            <a:schemeClr val="lt1"/>
+          </a:fontRef>
+        </p:style>
+        <p:txBody>
+          <a:bodyPr rtlCol="0" anchor="ctr"/>
+          <a:lstStyle/>
+          <a:p>
+            <a:pPr algn="ctr"/>
+            <a:endParaRPr lang="zh-TW" altLang="en-US"/>
+          </a:p>
+        </p:txBody>
+      </p:sp>
+      <p:pic>
+        <p:nvPicPr>
+          <p:cNvPr id="3" name="圖片 2">
+            <a:extLst>
+              <a:ext uri="{FF2B5EF4-FFF2-40B4-BE49-F238E27FC236}">
+                <a16:creationId xmlns:a16="http://schemas.microsoft.com/office/drawing/2014/main" id="{285820CB-1296-4051-6676-7E79C185C8E2}"/>
+              </a:ext>
+            </a:extLst>
+          </p:cNvPr>
+          <p:cNvPicPr>
+            <a:picLocks noChangeAspect="1"/>
+          </p:cNvPicPr>
+          <p:nvPr/>
+        </p:nvPicPr>
+        <p:blipFill>
+          <a:blip r:embed="rId2">
+            <a:extLst>
+              <a:ext uri="{28A0092B-C50C-407E-A947-70E740481C1C}">
+                <a14:useLocalDpi xmlns:a14="http://schemas.microsoft.com/office/drawing/2010/main" val="0"/>
+              </a:ext>
+            </a:extLst>
+          </a:blip>
+          <a:stretch>
+            <a:fillRect/>
+          </a:stretch>
+        </p:blipFill>
+        <p:spPr>
+          <a:xfrm>
+            <a:off x="4361792" y="1789385"/>
+            <a:ext cx="3279230" cy="3279230"/>
+          </a:xfrm>
+          <a:prstGeom prst="rect">
+            <a:avLst/>
+          </a:prstGeom>
+        </p:spPr>
+      </p:pic>
+    </p:spTree>
+    <p:extLst>
+      <p:ext uri="{BB962C8B-B14F-4D97-AF65-F5344CB8AC3E}">
+        <p14:creationId xmlns:p14="http://schemas.microsoft.com/office/powerpoint/2010/main" val="520341336"/>
+      </p:ext>
+    </p:extLst>
+  </p:cSld>
+  <p:clrMapOvr>
+    <a:masterClrMapping/>
+  </p:clrMapOvr>
+</p:sld>
+</file>
+
+<file path=ppt/slides/slide9.xml><?xml version="1.0" encoding="utf-8"?>
+<p:sld xmlns:a="http://schemas.openxmlformats.org/drawingml/2006/main" xmlns:r="http://schemas.openxmlformats.org/officeDocument/2006/relationships" xmlns:p="http://schemas.openxmlformats.org/presentationml/2006/main">
+  <p:cSld>
+    <p:spTree>
+      <p:nvGrpSpPr>
+        <p:cNvPr id="1" name=""/>
+        <p:cNvGrpSpPr/>
+        <p:nvPr/>
+      </p:nvGrpSpPr>
+      <p:grpSpPr>
+        <a:xfrm>
+          <a:off x="0" y="0"/>
+          <a:ext cx="0" cy="0"/>
+          <a:chOff x="0" y="0"/>
+          <a:chExt cx="0" cy="0"/>
+        </a:xfrm>
+      </p:grpSpPr>
+      <p:sp>
+        <p:nvSpPr>
+          <p:cNvPr id="6" name="矩形 5">
+            <a:extLst>
+              <a:ext uri="{FF2B5EF4-FFF2-40B4-BE49-F238E27FC236}">
+                <a16:creationId xmlns:a16="http://schemas.microsoft.com/office/drawing/2014/main" id="{8667C163-184C-C350-9735-2B23EDD3E681}"/>
+              </a:ext>
+            </a:extLst>
+          </p:cNvPr>
+          <p:cNvSpPr/>
+          <p:nvPr/>
+        </p:nvSpPr>
+        <p:spPr>
+          <a:xfrm>
+            <a:off x="3907746" y="1095703"/>
+            <a:ext cx="4376508" cy="4666593"/>
+          </a:xfrm>
+          <a:prstGeom prst="rect">
+            <a:avLst/>
+          </a:prstGeom>
+          <a:solidFill>
+            <a:schemeClr val="bg1"/>
+          </a:solidFill>
+          <a:ln>
+            <a:noFill/>
+          </a:ln>
+        </p:spPr>
+        <p:style>
+          <a:lnRef idx="2">
+            <a:schemeClr val="accent1">
+              <a:shade val="15000"/>
+            </a:schemeClr>
+          </a:lnRef>
+          <a:fillRef idx="1">
+            <a:schemeClr val="accent1"/>
+          </a:fillRef>
+          <a:effectRef idx="0">
+            <a:schemeClr val="accent1"/>
+          </a:effectRef>
+          <a:fontRef idx="minor">
+            <a:schemeClr val="lt1"/>
+          </a:fontRef>
+        </p:style>
+        <p:txBody>
+          <a:bodyPr rtlCol="0" anchor="ctr"/>
+          <a:lstStyle/>
+          <a:p>
+            <a:pPr algn="ctr"/>
+            <a:endParaRPr lang="zh-TW" altLang="en-US"/>
+          </a:p>
+        </p:txBody>
+      </p:sp>
+      <p:pic>
+        <p:nvPicPr>
+          <p:cNvPr id="4" name="圖片 3">
+            <a:extLst>
+              <a:ext uri="{FF2B5EF4-FFF2-40B4-BE49-F238E27FC236}">
+                <a16:creationId xmlns:a16="http://schemas.microsoft.com/office/drawing/2014/main" id="{77922D05-C9A1-4804-B5F4-64979A4708E2}"/>
+              </a:ext>
+            </a:extLst>
+          </p:cNvPr>
+          <p:cNvPicPr>
+            <a:picLocks noChangeAspect="1"/>
+          </p:cNvPicPr>
+          <p:nvPr/>
+        </p:nvPicPr>
+        <p:blipFill>
+          <a:blip r:embed="rId2">
+            <a:extLst>
+              <a:ext uri="{28A0092B-C50C-407E-A947-70E740481C1C}">
+                <a14:useLocalDpi xmlns:a14="http://schemas.microsoft.com/office/drawing/2010/main" val="0"/>
+              </a:ext>
+            </a:extLst>
+          </a:blip>
+          <a:stretch>
+            <a:fillRect/>
+          </a:stretch>
+        </p:blipFill>
+        <p:spPr>
+          <a:xfrm>
+            <a:off x="4624552" y="1957552"/>
+            <a:ext cx="2942896" cy="2942896"/>
+          </a:xfrm>
+          <a:prstGeom prst="rect">
+            <a:avLst/>
+          </a:prstGeom>
+        </p:spPr>
+      </p:pic>
+    </p:spTree>
+    <p:extLst>
+      <p:ext uri="{BB962C8B-B14F-4D97-AF65-F5344CB8AC3E}">
+        <p14:creationId xmlns:p14="http://schemas.microsoft.com/office/powerpoint/2010/main" val="9141832"/>
+      </p:ext>
+    </p:extLst>
+  </p:cSld>
+  <p:clrMapOvr>
+    <a:masterClrMapping/>
+  </p:clrMapOvr>
+</p:sld>
+</file>
+
 <file path=ppt/theme/theme1.xml><?xml version="1.0" encoding="utf-8"?>
 <a:theme xmlns:a="http://schemas.openxmlformats.org/drawingml/2006/main" name="Office 佈景主題">
   <a:themeElements>

</xml_diff>